<commit_message>
add paper presentation ppt
</commit_message>
<xml_diff>
--- a/docs/ppt(final)/teenHub_final.pptx
+++ b/docs/ppt(final)/teenHub_final.pptx
@@ -244,7 +244,7 @@
   </p:defaultTextStyle>
   <p:extLst>
     <p:ext uri="{EFAFB233-063F-42B5-8137-9DF3F51BA10A}">
-      <p15:sldGuideLst xmlns:p15="http://schemas.microsoft.com/office/powerpoint/2012/main"/>
+      <p15:sldGuideLst xmlns:p15="http://schemas.microsoft.com/office/powerpoint/2012/main" xmlns=""/>
     </p:ext>
   </p:extLst>
 </p:presentation>
@@ -421,7 +421,7 @@
     </p:spTree>
     <p:extLst>
       <p:ext uri="{BB962C8B-B14F-4D97-AF65-F5344CB8AC3E}">
-        <p14:creationId xmlns:p14="http://schemas.microsoft.com/office/powerpoint/2010/main" val="563773939"/>
+        <p14:creationId xmlns:p14="http://schemas.microsoft.com/office/powerpoint/2010/main" xmlns="" val="563773939"/>
       </p:ext>
     </p:extLst>
   </p:cSld>
@@ -617,7 +617,7 @@
     </p:spTree>
     <p:extLst>
       <p:ext uri="{BB962C8B-B14F-4D97-AF65-F5344CB8AC3E}">
-        <p14:creationId xmlns:p14="http://schemas.microsoft.com/office/powerpoint/2010/main" val="650742209"/>
+        <p14:creationId xmlns:p14="http://schemas.microsoft.com/office/powerpoint/2010/main" xmlns="" val="650742209"/>
       </p:ext>
     </p:extLst>
   </p:cSld>
@@ -723,7 +723,7 @@
     </p:spTree>
     <p:extLst>
       <p:ext uri="{BB962C8B-B14F-4D97-AF65-F5344CB8AC3E}">
-        <p14:creationId xmlns:p14="http://schemas.microsoft.com/office/powerpoint/2010/main" val="1068056685"/>
+        <p14:creationId xmlns:p14="http://schemas.microsoft.com/office/powerpoint/2010/main" xmlns="" val="1068056685"/>
       </p:ext>
     </p:extLst>
   </p:cSld>
@@ -829,7 +829,7 @@
     </p:spTree>
     <p:extLst>
       <p:ext uri="{BB962C8B-B14F-4D97-AF65-F5344CB8AC3E}">
-        <p14:creationId xmlns:p14="http://schemas.microsoft.com/office/powerpoint/2010/main" val="2321704134"/>
+        <p14:creationId xmlns:p14="http://schemas.microsoft.com/office/powerpoint/2010/main" xmlns="" val="2321704134"/>
       </p:ext>
     </p:extLst>
   </p:cSld>
@@ -935,7 +935,7 @@
     </p:spTree>
     <p:extLst>
       <p:ext uri="{BB962C8B-B14F-4D97-AF65-F5344CB8AC3E}">
-        <p14:creationId xmlns:p14="http://schemas.microsoft.com/office/powerpoint/2010/main" val="56583376"/>
+        <p14:creationId xmlns:p14="http://schemas.microsoft.com/office/powerpoint/2010/main" xmlns="" val="56583376"/>
       </p:ext>
     </p:extLst>
   </p:cSld>
@@ -1041,7 +1041,7 @@
     </p:spTree>
     <p:extLst>
       <p:ext uri="{BB962C8B-B14F-4D97-AF65-F5344CB8AC3E}">
-        <p14:creationId xmlns:p14="http://schemas.microsoft.com/office/powerpoint/2010/main" val="763428659"/>
+        <p14:creationId xmlns:p14="http://schemas.microsoft.com/office/powerpoint/2010/main" xmlns="" val="763428659"/>
       </p:ext>
     </p:extLst>
   </p:cSld>
@@ -1147,7 +1147,7 @@
     </p:spTree>
     <p:extLst>
       <p:ext uri="{BB962C8B-B14F-4D97-AF65-F5344CB8AC3E}">
-        <p14:creationId xmlns:p14="http://schemas.microsoft.com/office/powerpoint/2010/main" val="2071201067"/>
+        <p14:creationId xmlns:p14="http://schemas.microsoft.com/office/powerpoint/2010/main" xmlns="" val="2071201067"/>
       </p:ext>
     </p:extLst>
   </p:cSld>
@@ -2169,6 +2169,12 @@
             </a:pPr>
             <a:fld id="{00000000-1234-1234-1234-123412341234}" type="slidenum">
               <a:rPr lang="en"/>
+              <a:pPr lvl="0" rtl="0">
+                <a:spcBef>
+                  <a:spcPts val="0"/>
+                </a:spcBef>
+                <a:buNone/>
+              </a:pPr>
               <a:t>‹#›</a:t>
             </a:fld>
             <a:endParaRPr lang="en"/>
@@ -2205,7 +2211,7 @@
     </p:spTree>
     <p:extLst>
       <p:ext uri="{BB962C8B-B14F-4D97-AF65-F5344CB8AC3E}">
-        <p14:creationId xmlns:p14="http://schemas.microsoft.com/office/powerpoint/2010/main" val="1349975774"/>
+        <p14:creationId xmlns:p14="http://schemas.microsoft.com/office/powerpoint/2010/main" xmlns="" val="1349975774"/>
       </p:ext>
     </p:extLst>
   </p:cSld>
@@ -2306,6 +2312,12 @@
             </a:pPr>
             <a:fld id="{00000000-1234-1234-1234-123412341234}" type="slidenum">
               <a:rPr lang="en"/>
+              <a:pPr lvl="0" algn="ctr">
+                <a:spcBef>
+                  <a:spcPts val="0"/>
+                </a:spcBef>
+                <a:buNone/>
+              </a:pPr>
               <a:t>‹#›</a:t>
             </a:fld>
             <a:endParaRPr lang="en"/>
@@ -2315,7 +2327,7 @@
     </p:spTree>
     <p:extLst>
       <p:ext uri="{BB962C8B-B14F-4D97-AF65-F5344CB8AC3E}">
-        <p14:creationId xmlns:p14="http://schemas.microsoft.com/office/powerpoint/2010/main" val="994093488"/>
+        <p14:creationId xmlns:p14="http://schemas.microsoft.com/office/powerpoint/2010/main" xmlns="" val="994093488"/>
       </p:ext>
     </p:extLst>
   </p:cSld>
@@ -5144,7 +5156,7 @@
     </p:spTree>
     <p:extLst>
       <p:ext uri="{BB962C8B-B14F-4D97-AF65-F5344CB8AC3E}">
-        <p14:creationId xmlns:p14="http://schemas.microsoft.com/office/powerpoint/2010/main" val="2921045854"/>
+        <p14:creationId xmlns:p14="http://schemas.microsoft.com/office/powerpoint/2010/main" xmlns="" val="2921045854"/>
       </p:ext>
     </p:extLst>
   </p:cSld>
@@ -5262,7 +5274,7 @@
           <p:cNvPr id="6" name="Picture 5">
             <a:extLst>
               <a:ext uri="{FF2B5EF4-FFF2-40B4-BE49-F238E27FC236}">
-                <a16:creationId xmlns:a16="http://schemas.microsoft.com/office/drawing/2014/main" id="{65F86DE3-D467-434B-8EFE-F4FA06210EC1}"/>
+                <a16:creationId xmlns:a16="http://schemas.microsoft.com/office/drawing/2014/main" xmlns="" id="{65F86DE3-D467-434B-8EFE-F4FA06210EC1}"/>
               </a:ext>
             </a:extLst>
           </p:cNvPr>
@@ -5292,7 +5304,7 @@
     </p:spTree>
     <p:extLst>
       <p:ext uri="{BB962C8B-B14F-4D97-AF65-F5344CB8AC3E}">
-        <p14:creationId xmlns:p14="http://schemas.microsoft.com/office/powerpoint/2010/main" val="3638212141"/>
+        <p14:creationId xmlns:p14="http://schemas.microsoft.com/office/powerpoint/2010/main" xmlns="" val="3638212141"/>
       </p:ext>
     </p:extLst>
   </p:cSld>
@@ -5435,6 +5447,12 @@
             </a:pPr>
             <a:fld id="{00000000-1234-1234-1234-123412341234}" type="slidenum">
               <a:rPr lang="en"/>
+              <a:pPr lvl="0" algn="r" rtl="0">
+                <a:spcBef>
+                  <a:spcPts val="0"/>
+                </a:spcBef>
+                <a:buNone/>
+              </a:pPr>
               <a:t>17</a:t>
             </a:fld>
             <a:endParaRPr lang="en"/>
@@ -5497,7 +5515,7 @@
           <p:cNvPr id="6" name="Shape 218">
             <a:extLst>
               <a:ext uri="{FF2B5EF4-FFF2-40B4-BE49-F238E27FC236}">
-                <a16:creationId xmlns:a16="http://schemas.microsoft.com/office/drawing/2014/main" id="{3150B489-4DBE-42A1-850B-3524248F8C98}"/>
+                <a16:creationId xmlns:a16="http://schemas.microsoft.com/office/drawing/2014/main" xmlns="" id="{3150B489-4DBE-42A1-850B-3524248F8C98}"/>
               </a:ext>
             </a:extLst>
           </p:cNvPr>
@@ -6184,7 +6202,7 @@
           <p:cNvPr id="3" name="Picture 2">
             <a:extLst>
               <a:ext uri="{FF2B5EF4-FFF2-40B4-BE49-F238E27FC236}">
-                <a16:creationId xmlns:a16="http://schemas.microsoft.com/office/drawing/2014/main" id="{027A8AFD-BB68-43B8-B783-48268B408891}"/>
+                <a16:creationId xmlns:a16="http://schemas.microsoft.com/office/drawing/2014/main" xmlns="" id="{027A8AFD-BB68-43B8-B783-48268B408891}"/>
               </a:ext>
             </a:extLst>
           </p:cNvPr>
@@ -6214,7 +6232,7 @@
           <p:cNvPr id="5" name="Picture 4">
             <a:extLst>
               <a:ext uri="{FF2B5EF4-FFF2-40B4-BE49-F238E27FC236}">
-                <a16:creationId xmlns:a16="http://schemas.microsoft.com/office/drawing/2014/main" id="{A0A29524-252B-4B4A-B7B6-9A791E86E2BD}"/>
+                <a16:creationId xmlns:a16="http://schemas.microsoft.com/office/drawing/2014/main" xmlns="" id="{A0A29524-252B-4B4A-B7B6-9A791E86E2BD}"/>
               </a:ext>
             </a:extLst>
           </p:cNvPr>
@@ -6244,7 +6262,7 @@
           <p:cNvPr id="8" name="Picture 7">
             <a:extLst>
               <a:ext uri="{FF2B5EF4-FFF2-40B4-BE49-F238E27FC236}">
-                <a16:creationId xmlns:a16="http://schemas.microsoft.com/office/drawing/2014/main" id="{B21BBF6B-F3AB-45DF-94C3-95E84E415B6A}"/>
+                <a16:creationId xmlns:a16="http://schemas.microsoft.com/office/drawing/2014/main" xmlns="" id="{B21BBF6B-F3AB-45DF-94C3-95E84E415B6A}"/>
               </a:ext>
             </a:extLst>
           </p:cNvPr>
@@ -6271,7 +6289,7 @@
     </p:spTree>
     <p:extLst>
       <p:ext uri="{BB962C8B-B14F-4D97-AF65-F5344CB8AC3E}">
-        <p14:creationId xmlns:p14="http://schemas.microsoft.com/office/powerpoint/2010/main" val="1296597246"/>
+        <p14:creationId xmlns:p14="http://schemas.microsoft.com/office/powerpoint/2010/main" xmlns="" val="1296597246"/>
       </p:ext>
     </p:extLst>
   </p:cSld>
@@ -6960,6 +6978,12 @@
             </a:pPr>
             <a:fld id="{00000000-1234-1234-1234-123412341234}" type="slidenum">
               <a:rPr lang="en"/>
+              <a:pPr lvl="0" algn="r" rtl="0">
+                <a:spcBef>
+                  <a:spcPts val="0"/>
+                </a:spcBef>
+                <a:buNone/>
+              </a:pPr>
               <a:t>18</a:t>
             </a:fld>
             <a:endParaRPr lang="en"/>
@@ -7017,7 +7041,7 @@
           <p:cNvPr id="3" name="Picture 2">
             <a:extLst>
               <a:ext uri="{FF2B5EF4-FFF2-40B4-BE49-F238E27FC236}">
-                <a16:creationId xmlns:a16="http://schemas.microsoft.com/office/drawing/2014/main" id="{477EC220-5E3A-49D4-8E15-78C6A1FF1C3F}"/>
+                <a16:creationId xmlns:a16="http://schemas.microsoft.com/office/drawing/2014/main" xmlns="" id="{477EC220-5E3A-49D4-8E15-78C6A1FF1C3F}"/>
               </a:ext>
             </a:extLst>
           </p:cNvPr>
@@ -7047,7 +7071,7 @@
           <p:cNvPr id="5" name="Picture 4">
             <a:extLst>
               <a:ext uri="{FF2B5EF4-FFF2-40B4-BE49-F238E27FC236}">
-                <a16:creationId xmlns:a16="http://schemas.microsoft.com/office/drawing/2014/main" id="{0A39BC16-E243-48ED-8A56-4EB3A6FDA84B}"/>
+                <a16:creationId xmlns:a16="http://schemas.microsoft.com/office/drawing/2014/main" xmlns="" id="{0A39BC16-E243-48ED-8A56-4EB3A6FDA84B}"/>
               </a:ext>
             </a:extLst>
           </p:cNvPr>
@@ -7077,7 +7101,7 @@
           <p:cNvPr id="7" name="Picture 6">
             <a:extLst>
               <a:ext uri="{FF2B5EF4-FFF2-40B4-BE49-F238E27FC236}">
-                <a16:creationId xmlns:a16="http://schemas.microsoft.com/office/drawing/2014/main" id="{46CEEA05-8BD2-40FE-9939-565EE90DF5A3}"/>
+                <a16:creationId xmlns:a16="http://schemas.microsoft.com/office/drawing/2014/main" xmlns="" id="{46CEEA05-8BD2-40FE-9939-565EE90DF5A3}"/>
               </a:ext>
             </a:extLst>
           </p:cNvPr>
@@ -7104,7 +7128,7 @@
     </p:spTree>
     <p:extLst>
       <p:ext uri="{BB962C8B-B14F-4D97-AF65-F5344CB8AC3E}">
-        <p14:creationId xmlns:p14="http://schemas.microsoft.com/office/powerpoint/2010/main" val="2941603438"/>
+        <p14:creationId xmlns:p14="http://schemas.microsoft.com/office/powerpoint/2010/main" xmlns="" val="2941603438"/>
       </p:ext>
     </p:extLst>
   </p:cSld>
@@ -7396,7 +7420,7 @@
     </p:spTree>
     <p:extLst>
       <p:ext uri="{BB962C8B-B14F-4D97-AF65-F5344CB8AC3E}">
-        <p14:creationId xmlns:p14="http://schemas.microsoft.com/office/powerpoint/2010/main" val="4153158187"/>
+        <p14:creationId xmlns:p14="http://schemas.microsoft.com/office/powerpoint/2010/main" xmlns="" val="4153158187"/>
       </p:ext>
     </p:extLst>
   </p:cSld>
@@ -7753,7 +7777,7 @@
     </p:spTree>
     <p:extLst>
       <p:ext uri="{BB962C8B-B14F-4D97-AF65-F5344CB8AC3E}">
-        <p14:creationId xmlns:p14="http://schemas.microsoft.com/office/powerpoint/2010/main" val="3786898400"/>
+        <p14:creationId xmlns:p14="http://schemas.microsoft.com/office/powerpoint/2010/main" xmlns="" val="3786898400"/>
       </p:ext>
     </p:extLst>
   </p:cSld>
@@ -8327,7 +8351,7 @@
     </p:spTree>
     <p:extLst>
       <p:ext uri="{BB962C8B-B14F-4D97-AF65-F5344CB8AC3E}">
-        <p14:creationId xmlns:p14="http://schemas.microsoft.com/office/powerpoint/2010/main" val="2416405525"/>
+        <p14:creationId xmlns:p14="http://schemas.microsoft.com/office/powerpoint/2010/main" xmlns="" val="2416405525"/>
       </p:ext>
     </p:extLst>
   </p:cSld>
@@ -8895,7 +8919,7 @@
     </p:spTree>
     <p:extLst>
       <p:ext uri="{BB962C8B-B14F-4D97-AF65-F5344CB8AC3E}">
-        <p14:creationId xmlns:p14="http://schemas.microsoft.com/office/powerpoint/2010/main" val="1555286613"/>
+        <p14:creationId xmlns:p14="http://schemas.microsoft.com/office/powerpoint/2010/main" xmlns="" val="1555286613"/>
       </p:ext>
     </p:extLst>
   </p:cSld>
@@ -9466,7 +9490,7 @@
     </p:spTree>
     <p:extLst>
       <p:ext uri="{BB962C8B-B14F-4D97-AF65-F5344CB8AC3E}">
-        <p14:creationId xmlns:p14="http://schemas.microsoft.com/office/powerpoint/2010/main" val="873864299"/>
+        <p14:creationId xmlns:p14="http://schemas.microsoft.com/office/powerpoint/2010/main" xmlns="" val="873864299"/>
       </p:ext>
     </p:extLst>
   </p:cSld>
@@ -9635,7 +9659,7 @@
     </p:spTree>
     <p:extLst>
       <p:ext uri="{BB962C8B-B14F-4D97-AF65-F5344CB8AC3E}">
-        <p14:creationId xmlns:p14="http://schemas.microsoft.com/office/powerpoint/2010/main" val="2076606239"/>
+        <p14:creationId xmlns:p14="http://schemas.microsoft.com/office/powerpoint/2010/main" xmlns="" val="2076606239"/>
       </p:ext>
     </p:extLst>
   </p:cSld>
@@ -10037,7 +10061,7 @@
     </p:spTree>
     <p:extLst>
       <p:ext uri="{BB962C8B-B14F-4D97-AF65-F5344CB8AC3E}">
-        <p14:creationId xmlns:p14="http://schemas.microsoft.com/office/powerpoint/2010/main" val="1295941601"/>
+        <p14:creationId xmlns:p14="http://schemas.microsoft.com/office/powerpoint/2010/main" xmlns="" val="1295941601"/>
       </p:ext>
     </p:extLst>
   </p:cSld>
@@ -10394,7 +10418,7 @@
     </p:spTree>
     <p:extLst>
       <p:ext uri="{BB962C8B-B14F-4D97-AF65-F5344CB8AC3E}">
-        <p14:creationId xmlns:p14="http://schemas.microsoft.com/office/powerpoint/2010/main" val="2925505686"/>
+        <p14:creationId xmlns:p14="http://schemas.microsoft.com/office/powerpoint/2010/main" xmlns="" val="2925505686"/>
       </p:ext>
     </p:extLst>
   </p:cSld>
@@ -10660,7 +10684,7 @@
     </p:spTree>
     <p:extLst>
       <p:ext uri="{BB962C8B-B14F-4D97-AF65-F5344CB8AC3E}">
-        <p14:creationId xmlns:p14="http://schemas.microsoft.com/office/powerpoint/2010/main" val="3865980025"/>
+        <p14:creationId xmlns:p14="http://schemas.microsoft.com/office/powerpoint/2010/main" xmlns="" val="3865980025"/>
       </p:ext>
     </p:extLst>
   </p:cSld>
@@ -10758,7 +10782,7 @@
           <p:cNvPr id="7" name="Shape 191">
             <a:extLst>
               <a:ext uri="{FF2B5EF4-FFF2-40B4-BE49-F238E27FC236}">
-                <a16:creationId xmlns:a16="http://schemas.microsoft.com/office/drawing/2014/main" id="{1E12D439-1F4E-4EDD-A07C-0498D9E7D3D5}"/>
+                <a16:creationId xmlns:a16="http://schemas.microsoft.com/office/drawing/2014/main" xmlns="" id="{1E12D439-1F4E-4EDD-A07C-0498D9E7D3D5}"/>
               </a:ext>
             </a:extLst>
           </p:cNvPr>
@@ -10826,7 +10850,7 @@
           <p:cNvPr id="8" name="Shape 192">
             <a:extLst>
               <a:ext uri="{FF2B5EF4-FFF2-40B4-BE49-F238E27FC236}">
-                <a16:creationId xmlns:a16="http://schemas.microsoft.com/office/drawing/2014/main" id="{4FA34C12-FEAE-4194-829F-D34D9E18FBDA}"/>
+                <a16:creationId xmlns:a16="http://schemas.microsoft.com/office/drawing/2014/main" xmlns="" id="{4FA34C12-FEAE-4194-829F-D34D9E18FBDA}"/>
               </a:ext>
             </a:extLst>
           </p:cNvPr>
@@ -10877,7 +10901,7 @@
           <p:cNvPr id="9" name="Shape 193">
             <a:extLst>
               <a:ext uri="{FF2B5EF4-FFF2-40B4-BE49-F238E27FC236}">
-                <a16:creationId xmlns:a16="http://schemas.microsoft.com/office/drawing/2014/main" id="{B5E30D08-362C-440F-9BD5-92B768C3DA81}"/>
+                <a16:creationId xmlns:a16="http://schemas.microsoft.com/office/drawing/2014/main" xmlns="" id="{B5E30D08-362C-440F-9BD5-92B768C3DA81}"/>
               </a:ext>
             </a:extLst>
           </p:cNvPr>
@@ -10945,7 +10969,7 @@
           <p:cNvPr id="10" name="Shape 193">
             <a:extLst>
               <a:ext uri="{FF2B5EF4-FFF2-40B4-BE49-F238E27FC236}">
-                <a16:creationId xmlns:a16="http://schemas.microsoft.com/office/drawing/2014/main" id="{7CC7E497-4BF3-4C6C-968F-C4BB3DE5832E}"/>
+                <a16:creationId xmlns:a16="http://schemas.microsoft.com/office/drawing/2014/main" xmlns="" id="{7CC7E497-4BF3-4C6C-968F-C4BB3DE5832E}"/>
               </a:ext>
             </a:extLst>
           </p:cNvPr>
@@ -11011,7 +11035,7 @@
     </p:spTree>
     <p:extLst>
       <p:ext uri="{BB962C8B-B14F-4D97-AF65-F5344CB8AC3E}">
-        <p14:creationId xmlns:p14="http://schemas.microsoft.com/office/powerpoint/2010/main" val="27549132"/>
+        <p14:creationId xmlns:p14="http://schemas.microsoft.com/office/powerpoint/2010/main" xmlns="" val="27549132"/>
       </p:ext>
     </p:extLst>
   </p:cSld>
@@ -11522,12 +11546,28 @@
               <a:buNone/>
             </a:pPr>
             <a:r>
+              <a:rPr lang="en-US" sz="1400">
+                <a:solidFill>
+                  <a:srgbClr val="FFFFFF"/>
+                </a:solidFill>
+              </a:rPr>
+              <a:t>The </a:t>
+            </a:r>
+            <a:r>
+              <a:rPr lang="en-US" sz="1400" smtClean="0">
+                <a:solidFill>
+                  <a:srgbClr val="FFFFFF"/>
+                </a:solidFill>
+              </a:rPr>
+              <a:t>project </a:t>
+            </a:r>
+            <a:r>
               <a:rPr lang="en-US" sz="1400" dirty="0">
                 <a:solidFill>
                   <a:srgbClr val="FFFFFF"/>
                 </a:solidFill>
               </a:rPr>
-              <a:t>The project is can be found at:</a:t>
+              <a:t>can be found at:</a:t>
             </a:r>
           </a:p>
           <a:p>
@@ -11586,6 +11626,12 @@
             </a:pPr>
             <a:fld id="{00000000-1234-1234-1234-123412341234}" type="slidenum">
               <a:rPr lang="en"/>
+              <a:pPr lvl="0">
+                <a:spcBef>
+                  <a:spcPts val="0"/>
+                </a:spcBef>
+                <a:buNone/>
+              </a:pPr>
               <a:t>29</a:t>
             </a:fld>
             <a:endParaRPr lang="en"/>
@@ -11595,7 +11641,7 @@
     </p:spTree>
     <p:extLst>
       <p:ext uri="{BB962C8B-B14F-4D97-AF65-F5344CB8AC3E}">
-        <p14:creationId xmlns:p14="http://schemas.microsoft.com/office/powerpoint/2010/main" val="4130971140"/>
+        <p14:creationId xmlns:p14="http://schemas.microsoft.com/office/powerpoint/2010/main" xmlns="" val="4130971140"/>
       </p:ext>
     </p:extLst>
   </p:cSld>
@@ -11780,7 +11826,7 @@
     </p:spTree>
     <p:extLst>
       <p:ext uri="{BB962C8B-B14F-4D97-AF65-F5344CB8AC3E}">
-        <p14:creationId xmlns:p14="http://schemas.microsoft.com/office/powerpoint/2010/main" val="3491065161"/>
+        <p14:creationId xmlns:p14="http://schemas.microsoft.com/office/powerpoint/2010/main" xmlns="" val="3491065161"/>
       </p:ext>
     </p:extLst>
   </p:cSld>
@@ -12225,7 +12271,7 @@
     </p:spTree>
     <p:extLst>
       <p:ext uri="{BB962C8B-B14F-4D97-AF65-F5344CB8AC3E}">
-        <p14:creationId xmlns:p14="http://schemas.microsoft.com/office/powerpoint/2010/main" val="3027948703"/>
+        <p14:creationId xmlns:p14="http://schemas.microsoft.com/office/powerpoint/2010/main" xmlns="" val="3027948703"/>
       </p:ext>
     </p:extLst>
   </p:cSld>
@@ -12260,7 +12306,7 @@
           <p:cNvPr id="2" name="Title 1">
             <a:extLst>
               <a:ext uri="{FF2B5EF4-FFF2-40B4-BE49-F238E27FC236}">
-                <a16:creationId xmlns:a16="http://schemas.microsoft.com/office/drawing/2014/main" id="{09FBF132-D237-4BF1-8116-B049A21F04FF}"/>
+                <a16:creationId xmlns:a16="http://schemas.microsoft.com/office/drawing/2014/main" xmlns="" id="{09FBF132-D237-4BF1-8116-B049A21F04FF}"/>
               </a:ext>
             </a:extLst>
           </p:cNvPr>
@@ -12293,7 +12339,7 @@
           <p:cNvPr id="3" name="Text Placeholder 2">
             <a:extLst>
               <a:ext uri="{FF2B5EF4-FFF2-40B4-BE49-F238E27FC236}">
-                <a16:creationId xmlns:a16="http://schemas.microsoft.com/office/drawing/2014/main" id="{38AC01CB-226F-4F59-AA36-5ACCDD047655}"/>
+                <a16:creationId xmlns:a16="http://schemas.microsoft.com/office/drawing/2014/main" xmlns="" id="{38AC01CB-226F-4F59-AA36-5ACCDD047655}"/>
               </a:ext>
             </a:extLst>
           </p:cNvPr>
@@ -12370,7 +12416,7 @@
           <p:cNvPr id="4" name="Slide Number Placeholder 3">
             <a:extLst>
               <a:ext uri="{FF2B5EF4-FFF2-40B4-BE49-F238E27FC236}">
-                <a16:creationId xmlns:a16="http://schemas.microsoft.com/office/drawing/2014/main" id="{DCB755EF-9758-4FC9-A797-9B4C0BA7EE9A}"/>
+                <a16:creationId xmlns:a16="http://schemas.microsoft.com/office/drawing/2014/main" xmlns="" id="{DCB755EF-9758-4FC9-A797-9B4C0BA7EE9A}"/>
               </a:ext>
             </a:extLst>
           </p:cNvPr>
@@ -12409,7 +12455,7 @@
     </p:spTree>
     <p:extLst>
       <p:ext uri="{BB962C8B-B14F-4D97-AF65-F5344CB8AC3E}">
-        <p14:creationId xmlns:p14="http://schemas.microsoft.com/office/powerpoint/2010/main" val="842431954"/>
+        <p14:creationId xmlns:p14="http://schemas.microsoft.com/office/powerpoint/2010/main" xmlns="" val="842431954"/>
       </p:ext>
     </p:extLst>
   </p:cSld>

</xml_diff>